<commit_message>
add answers to all questions
</commit_message>
<xml_diff>
--- a/Anmol_More_Presentation.pptx
+++ b/Anmol_More_Presentation.pptx
@@ -3321,7 +3321,7 @@
             </a:lvl9pPr>
           </a:lstStyle>
           <a:p>
-            <a:endParaRPr lang="en-US" sz="1800" b="1" kern="0" dirty="0"/>
+            <a:endParaRPr lang="en-US" sz="1800" kern="0" dirty="0"/>
           </a:p>
           <a:p>
             <a:pPr>
@@ -3329,10 +3329,20 @@
               <a:buChar char="Ø"/>
             </a:pPr>
             <a:r>
-              <a:rPr lang="en-US" sz="1800" b="1" kern="0" dirty="0"/>
-              <a:t>Overall Score :</a:t>
-            </a:r>
-            <a:endParaRPr lang="en-US" sz="1600" b="0" kern="0" dirty="0"/>
+              <a:rPr lang="en-US" sz="1800" kern="0" dirty="0"/>
+              <a:t>Apply user – user, reviews – reviews collaborative filtering</a:t>
+            </a:r>
+          </a:p>
+          <a:p>
+            <a:pPr>
+              <a:buFont typeface="Wingdings" pitchFamily="2" charset="2"/>
+              <a:buChar char="Ø"/>
+            </a:pPr>
+            <a:r>
+              <a:rPr lang="en-US" sz="1800" kern="0" dirty="0"/>
+              <a:t>Use user – reviews</a:t>
+            </a:r>
+            <a:endParaRPr lang="en-US" sz="1600" kern="0" dirty="0"/>
           </a:p>
           <a:p>
             <a:pPr marL="457200" lvl="1" indent="0">
@@ -4597,9 +4607,17 @@
           <a:bodyPr/>
           <a:lstStyle/>
           <a:p>
+            <a:pPr algn="ctr"/>
             <a:r>
               <a:rPr lang="en-US" dirty="0"/>
-              <a:t>GCP Natural Language</a:t>
+              <a:t>Natural Language Processing</a:t>
+            </a:r>
+            <a:br>
+              <a:rPr lang="en-US" dirty="0"/>
+            </a:br>
+            <a:r>
+              <a:rPr lang="en-US" dirty="0"/>
+              <a:t>(Text Reviews Analysis)</a:t>
             </a:r>
           </a:p>
         </p:txBody>
@@ -4620,14 +4638,54 @@
             <p:ph idx="1"/>
           </p:nvPr>
         </p:nvSpPr>
-        <p:spPr/>
+        <p:spPr>
+          <a:xfrm>
+            <a:off x="1043608" y="2465388"/>
+            <a:ext cx="7643812" cy="4392612"/>
+          </a:xfrm>
+        </p:spPr>
         <p:txBody>
           <a:bodyPr/>
           <a:lstStyle/>
           <a:p>
             <a:r>
+              <a:rPr lang="en-US" b="1" dirty="0"/>
+              <a:t>Tried</a:t>
+            </a:r>
+            <a:r>
               <a:rPr lang="en-US" dirty="0"/>
-              <a:t>Text reviews sentiment analysis cloud APIs</a:t>
+              <a:t> :</a:t>
+            </a:r>
+          </a:p>
+          <a:p>
+            <a:pPr marL="0" indent="0">
+              <a:buNone/>
+            </a:pPr>
+            <a:endParaRPr lang="en-US" dirty="0"/>
+          </a:p>
+          <a:p>
+            <a:pPr lvl="1"/>
+            <a:r>
+              <a:rPr lang="en-US" b="0" dirty="0"/>
+              <a:t>Text reviews sentiment analysis GCP NLP sentiment analysis. Failed few times, tried with smaller set</a:t>
+            </a:r>
+          </a:p>
+          <a:p>
+            <a:pPr lvl="1"/>
+            <a:r>
+              <a:rPr lang="en-US" b="0" dirty="0" err="1"/>
+              <a:t>Huggingface</a:t>
+            </a:r>
+            <a:r>
+              <a:rPr lang="en-US" b="0" dirty="0"/>
+              <a:t> models on local machine</a:t>
+            </a:r>
+          </a:p>
+          <a:p>
+            <a:pPr lvl="1"/>
+            <a:r>
+              <a:rPr lang="en-US" b="0" dirty="0"/>
+              <a:t>NLTK</a:t>
             </a:r>
           </a:p>
         </p:txBody>
@@ -4933,7 +4991,104 @@
             </a:pPr>
             <a:r>
               <a:rPr lang="en-US" sz="1800" b="1" kern="0" dirty="0"/>
-              <a:t>Favorite :</a:t>
+              <a:t>Favorite : </a:t>
+            </a:r>
+            <a:r>
+              <a:rPr lang="en-IN" sz="1800" b="1" dirty="0"/>
+              <a:t>English Bitter</a:t>
+            </a:r>
+          </a:p>
+          <a:p>
+            <a:pPr>
+              <a:buFont typeface="Wingdings" pitchFamily="2" charset="2"/>
+              <a:buChar char="Ø"/>
+            </a:pPr>
+            <a:endParaRPr lang="en-IN" sz="1800" b="1" kern="0" dirty="0"/>
+          </a:p>
+          <a:p>
+            <a:pPr>
+              <a:buFont typeface="Wingdings" pitchFamily="2" charset="2"/>
+              <a:buChar char="Ø"/>
+            </a:pPr>
+            <a:r>
+              <a:rPr lang="en-IN" sz="1800" b="1" kern="0" dirty="0"/>
+              <a:t>Considerations</a:t>
+            </a:r>
+          </a:p>
+          <a:p>
+            <a:pPr lvl="1">
+              <a:buFont typeface="Wingdings" pitchFamily="2" charset="2"/>
+              <a:buChar char="Ø"/>
+            </a:pPr>
+            <a:r>
+              <a:rPr lang="en-IN" sz="1400" b="0" kern="0" dirty="0"/>
+              <a:t>Tried GCP NLP API on sample set of 500</a:t>
+            </a:r>
+          </a:p>
+          <a:p>
+            <a:pPr lvl="1">
+              <a:buFont typeface="Wingdings" pitchFamily="2" charset="2"/>
+              <a:buChar char="Ø"/>
+            </a:pPr>
+            <a:r>
+              <a:rPr lang="en-IN" sz="1400" b="0" kern="0" dirty="0"/>
+              <a:t>Take mean of all reviews, grouped by beer style</a:t>
+            </a:r>
+            <a:endParaRPr lang="en-US" sz="1400" b="0" kern="0" dirty="0"/>
+          </a:p>
+          <a:p>
+            <a:pPr marL="0" indent="0">
+              <a:buNone/>
+            </a:pPr>
+            <a:endParaRPr lang="en-US" sz="1800" b="1" kern="0" dirty="0"/>
+          </a:p>
+          <a:p>
+            <a:pPr marL="0" indent="0">
+              <a:buNone/>
+            </a:pPr>
+            <a:r>
+              <a:rPr lang="en-US" sz="1800" b="1" kern="0" dirty="0"/>
+              <a:t>Top 3 – A bigger sample set is required</a:t>
+            </a:r>
+          </a:p>
+          <a:p>
+            <a:pPr marL="0" indent="0">
+              <a:buNone/>
+            </a:pPr>
+            <a:endParaRPr lang="en-US" sz="1800" b="1" kern="0" dirty="0"/>
+          </a:p>
+          <a:p>
+            <a:pPr>
+              <a:buFont typeface="Wingdings" pitchFamily="2" charset="2"/>
+              <a:buChar char="Ø"/>
+            </a:pPr>
+            <a:r>
+              <a:rPr lang="en-IN" sz="1600" dirty="0"/>
+              <a:t>English Bitter - 0.7</a:t>
+            </a:r>
+          </a:p>
+          <a:p>
+            <a:pPr>
+              <a:buFont typeface="Wingdings" pitchFamily="2" charset="2"/>
+              <a:buChar char="Ø"/>
+            </a:pPr>
+            <a:r>
+              <a:rPr lang="en-IN" sz="1600" dirty="0"/>
+              <a:t>American Black Ale - 0.6</a:t>
+            </a:r>
+          </a:p>
+          <a:p>
+            <a:pPr>
+              <a:buFont typeface="Wingdings" pitchFamily="2" charset="2"/>
+              <a:buChar char="Ø"/>
+            </a:pPr>
+            <a:r>
+              <a:rPr lang="en-IN" sz="1600" dirty="0" err="1"/>
+              <a:t>Dunkelweizen</a:t>
+            </a:r>
+            <a:r>
+              <a:rPr lang="en-IN" sz="1600" dirty="0"/>
+              <a:t> - 0.5</a:t>
             </a:r>
             <a:endParaRPr lang="en-US" sz="1600" b="0" kern="0" dirty="0"/>
           </a:p>
@@ -5000,7 +5155,7 @@
         </p:nvSpPr>
         <p:spPr>
           <a:xfrm>
-            <a:off x="2051720" y="666433"/>
+            <a:off x="2123728" y="666433"/>
             <a:ext cx="6911975" cy="723900"/>
           </a:xfrm>
         </p:spPr>
@@ -5239,7 +5394,11 @@
             </a:pPr>
             <a:r>
               <a:rPr lang="en-US" sz="1800" b="1" kern="0" dirty="0"/>
-              <a:t>Written review mean sentiment :</a:t>
+              <a:t>Text review mean sentiment : 3.3 </a:t>
+            </a:r>
+            <a:r>
+              <a:rPr lang="en-US" sz="1800" kern="0" dirty="0"/>
+              <a:t>on scale of (1,5)</a:t>
             </a:r>
           </a:p>
           <a:p>
@@ -5248,8 +5407,12 @@
               <a:buChar char="Ø"/>
             </a:pPr>
             <a:r>
+              <a:rPr lang="en-US" sz="1800" kern="0" dirty="0"/>
+              <a:t>Mean</a:t>
+            </a:r>
+            <a:r>
               <a:rPr lang="en-US" sz="1800" b="1" kern="0" dirty="0"/>
-              <a:t>Overall review score</a:t>
+              <a:t> review score : 3.8</a:t>
             </a:r>
           </a:p>
           <a:p>
@@ -5272,14 +5435,14 @@
               <a:buChar char="Ø"/>
             </a:pPr>
             <a:r>
-              <a:rPr lang="en-US" sz="1800" b="1" kern="0" dirty="0"/>
-              <a:t>GCP – Cloud </a:t>
-            </a:r>
-            <a:r>
-              <a:rPr lang="en-US" sz="1800" b="1" kern="0"/>
-              <a:t>Natural Language</a:t>
-            </a:r>
-            <a:endParaRPr lang="en-US" sz="1600" b="0" kern="0" dirty="0"/>
+              <a:rPr lang="en-US" sz="1800" kern="0" dirty="0"/>
+              <a:t>Text reviews are good proxy to </a:t>
+            </a:r>
+            <a:r>
+              <a:rPr lang="en-US" sz="1800" kern="0"/>
+              <a:t>beer user rating</a:t>
+            </a:r>
+            <a:endParaRPr lang="en-US" sz="1600" kern="0" dirty="0"/>
           </a:p>
           <a:p>
             <a:pPr marL="457200" lvl="1" indent="0">

</xml_diff>

<commit_message>
clean and update all files
</commit_message>
<xml_diff>
--- a/Anmol_More_Presentation.pptx
+++ b/Anmol_More_Presentation.pptx
@@ -3320,6 +3320,15 @@
               </a:defRPr>
             </a:lvl9pPr>
           </a:lstStyle>
+          <a:p>
+            <a:pPr marL="0" indent="0">
+              <a:buNone/>
+            </a:pPr>
+            <a:r>
+              <a:rPr lang="en-US" sz="1800" b="1" kern="0" dirty="0"/>
+              <a:t>TODO</a:t>
+            </a:r>
+          </a:p>
           <a:p>
             <a:endParaRPr lang="en-US" sz="1800" kern="0" dirty="0"/>
           </a:p>

</xml_diff>